<commit_message>
adding tests for rest apis
</commit_message>
<xml_diff>
--- a/docs/project.pptx
+++ b/docs/project.pptx
@@ -268,7 +268,7 @@
           <a:p>
             <a:fld id="{DF7189C5-6E85-4FE2-A0D4-1F92D7BE09D1}" type="datetimeFigureOut">
               <a:rPr lang="en-IN" smtClean="0"/>
-              <a:t>09-06-2015</a:t>
+              <a:t>11-06-2015</a:t>
             </a:fld>
             <a:endParaRPr lang="en-IN"/>
           </a:p>
@@ -438,7 +438,7 @@
           <a:p>
             <a:fld id="{DF7189C5-6E85-4FE2-A0D4-1F92D7BE09D1}" type="datetimeFigureOut">
               <a:rPr lang="en-IN" smtClean="0"/>
-              <a:t>09-06-2015</a:t>
+              <a:t>11-06-2015</a:t>
             </a:fld>
             <a:endParaRPr lang="en-IN"/>
           </a:p>
@@ -618,7 +618,7 @@
           <a:p>
             <a:fld id="{DF7189C5-6E85-4FE2-A0D4-1F92D7BE09D1}" type="datetimeFigureOut">
               <a:rPr lang="en-IN" smtClean="0"/>
-              <a:t>09-06-2015</a:t>
+              <a:t>11-06-2015</a:t>
             </a:fld>
             <a:endParaRPr lang="en-IN"/>
           </a:p>
@@ -788,7 +788,7 @@
           <a:p>
             <a:fld id="{DF7189C5-6E85-4FE2-A0D4-1F92D7BE09D1}" type="datetimeFigureOut">
               <a:rPr lang="en-IN" smtClean="0"/>
-              <a:t>09-06-2015</a:t>
+              <a:t>11-06-2015</a:t>
             </a:fld>
             <a:endParaRPr lang="en-IN"/>
           </a:p>
@@ -1034,7 +1034,7 @@
           <a:p>
             <a:fld id="{DF7189C5-6E85-4FE2-A0D4-1F92D7BE09D1}" type="datetimeFigureOut">
               <a:rPr lang="en-IN" smtClean="0"/>
-              <a:t>09-06-2015</a:t>
+              <a:t>11-06-2015</a:t>
             </a:fld>
             <a:endParaRPr lang="en-IN"/>
           </a:p>
@@ -1266,7 +1266,7 @@
           <a:p>
             <a:fld id="{DF7189C5-6E85-4FE2-A0D4-1F92D7BE09D1}" type="datetimeFigureOut">
               <a:rPr lang="en-IN" smtClean="0"/>
-              <a:t>09-06-2015</a:t>
+              <a:t>11-06-2015</a:t>
             </a:fld>
             <a:endParaRPr lang="en-IN"/>
           </a:p>
@@ -1633,7 +1633,7 @@
           <a:p>
             <a:fld id="{DF7189C5-6E85-4FE2-A0D4-1F92D7BE09D1}" type="datetimeFigureOut">
               <a:rPr lang="en-IN" smtClean="0"/>
-              <a:t>09-06-2015</a:t>
+              <a:t>11-06-2015</a:t>
             </a:fld>
             <a:endParaRPr lang="en-IN"/>
           </a:p>
@@ -1751,7 +1751,7 @@
           <a:p>
             <a:fld id="{DF7189C5-6E85-4FE2-A0D4-1F92D7BE09D1}" type="datetimeFigureOut">
               <a:rPr lang="en-IN" smtClean="0"/>
-              <a:t>09-06-2015</a:t>
+              <a:t>11-06-2015</a:t>
             </a:fld>
             <a:endParaRPr lang="en-IN"/>
           </a:p>
@@ -1846,7 +1846,7 @@
           <a:p>
             <a:fld id="{DF7189C5-6E85-4FE2-A0D4-1F92D7BE09D1}" type="datetimeFigureOut">
               <a:rPr lang="en-IN" smtClean="0"/>
-              <a:t>09-06-2015</a:t>
+              <a:t>11-06-2015</a:t>
             </a:fld>
             <a:endParaRPr lang="en-IN"/>
           </a:p>
@@ -2123,7 +2123,7 @@
           <a:p>
             <a:fld id="{DF7189C5-6E85-4FE2-A0D4-1F92D7BE09D1}" type="datetimeFigureOut">
               <a:rPr lang="en-IN" smtClean="0"/>
-              <a:t>09-06-2015</a:t>
+              <a:t>11-06-2015</a:t>
             </a:fld>
             <a:endParaRPr lang="en-IN"/>
           </a:p>
@@ -2376,7 +2376,7 @@
           <a:p>
             <a:fld id="{DF7189C5-6E85-4FE2-A0D4-1F92D7BE09D1}" type="datetimeFigureOut">
               <a:rPr lang="en-IN" smtClean="0"/>
-              <a:t>09-06-2015</a:t>
+              <a:t>11-06-2015</a:t>
             </a:fld>
             <a:endParaRPr lang="en-IN"/>
           </a:p>
@@ -2589,7 +2589,7 @@
           <a:p>
             <a:fld id="{DF7189C5-6E85-4FE2-A0D4-1F92D7BE09D1}" type="datetimeFigureOut">
               <a:rPr lang="en-IN" smtClean="0"/>
-              <a:t>09-06-2015</a:t>
+              <a:t>11-06-2015</a:t>
             </a:fld>
             <a:endParaRPr lang="en-IN"/>
           </a:p>
@@ -4787,11 +4787,7 @@
           <a:p>
             <a:r>
               <a:rPr lang="en-IN" dirty="0" smtClean="0"/>
-              <a:t>Do the same with </a:t>
-            </a:r>
-            <a:r>
-              <a:rPr lang="en-IN" dirty="0" smtClean="0"/>
-              <a:t>Fiddler</a:t>
+              <a:t>Do the same with Fiddler</a:t>
             </a:r>
           </a:p>
           <a:p>
@@ -5403,7 +5399,6 @@
               <a:rPr lang="en-IN" dirty="0" smtClean="0"/>
               <a:t> </a:t>
             </a:r>
-            <a:endParaRPr lang="en-IN" dirty="0" smtClean="0"/>
           </a:p>
           <a:p>
             <a:r>
@@ -5412,7 +5407,18 @@
             </a:r>
             <a:r>
               <a:rPr lang="en-IN" dirty="0"/>
-              <a:t>Framework: </a:t>
+              <a:t>Framework</a:t>
+            </a:r>
+            <a:r>
+              <a:rPr lang="en-IN" dirty="0" smtClean="0"/>
+              <a:t>:</a:t>
+            </a:r>
+          </a:p>
+          <a:p>
+            <a:pPr lvl="1"/>
+            <a:r>
+              <a:rPr lang="en-IN" dirty="0" smtClean="0"/>
+              <a:t> </a:t>
             </a:r>
             <a:r>
               <a:rPr lang="en-IN" dirty="0">
@@ -5425,6 +5431,26 @@
                 <a:hlinkClick r:id="rId5"/>
               </a:rPr>
               <a:t>jasmine.github.io/2.0/node.html</a:t>
+            </a:r>
+            <a:r>
+              <a:rPr lang="en-IN" dirty="0" smtClean="0"/>
+              <a:t> </a:t>
+            </a:r>
+            <a:endParaRPr lang="en-IN" dirty="0" smtClean="0"/>
+          </a:p>
+          <a:p>
+            <a:pPr lvl="1"/>
+            <a:r>
+              <a:rPr lang="en-IN" dirty="0">
+                <a:hlinkClick r:id="rId6"/>
+              </a:rPr>
+              <a:t>https://</a:t>
+            </a:r>
+            <a:r>
+              <a:rPr lang="en-IN" dirty="0" smtClean="0">
+                <a:hlinkClick r:id="rId6"/>
+              </a:rPr>
+              <a:t>semaphoreci.com/community/tutorials/getting-started-with-node-js-and-jasmine</a:t>
             </a:r>
             <a:r>
               <a:rPr lang="en-IN" dirty="0" smtClean="0"/>

</xml_diff>